<commit_message>
Code refactoring, update Presentation van Emde Boas tree.pptx, update  README.md
</commit_message>
<xml_diff>
--- a/Presentation van Emde Boas tree.pptx
+++ b/Presentation van Emde Boas tree.pptx
@@ -6,6 +6,17 @@
   </p:sldMasterIdLst>
   <p:sldIdLst>
     <p:sldId id="256" r:id="rId2"/>
+    <p:sldId id="267" r:id="rId3"/>
+    <p:sldId id="257" r:id="rId4"/>
+    <p:sldId id="268" r:id="rId5"/>
+    <p:sldId id="258" r:id="rId6"/>
+    <p:sldId id="259" r:id="rId7"/>
+    <p:sldId id="261" r:id="rId8"/>
+    <p:sldId id="262" r:id="rId9"/>
+    <p:sldId id="263" r:id="rId10"/>
+    <p:sldId id="264" r:id="rId11"/>
+    <p:sldId id="265" r:id="rId12"/>
+    <p:sldId id="266" r:id="rId13"/>
   </p:sldIdLst>
   <p:sldSz cx="12192000" cy="6858000"/>
   <p:notesSz cx="6858000" cy="9144000"/>
@@ -104,6 +115,11 @@
       </a:defRPr>
     </a:lvl9pPr>
   </p:defaultTextStyle>
+  <p:extLst>
+    <p:ext uri="{EFAFB233-063F-42B5-8137-9DF3F51BA10A}">
+      <p15:sldGuideLst xmlns:p15="http://schemas.microsoft.com/office/powerpoint/2012/main"/>
+    </p:ext>
+  </p:extLst>
 </p:presentation>
 </file>
 
@@ -254,7 +270,7 @@
           <a:p>
             <a:fld id="{50286413-5449-47E4-B1FF-6B5C4CB35255}" type="datetimeFigureOut">
               <a:rPr lang="ru-RU" smtClean="0"/>
-              <a:t>13.12.2022</a:t>
+              <a:t>10.01.2023</a:t>
             </a:fld>
             <a:endParaRPr lang="ru-RU"/>
           </a:p>
@@ -452,7 +468,7 @@
           <a:p>
             <a:fld id="{50286413-5449-47E4-B1FF-6B5C4CB35255}" type="datetimeFigureOut">
               <a:rPr lang="ru-RU" smtClean="0"/>
-              <a:t>13.12.2022</a:t>
+              <a:t>10.01.2023</a:t>
             </a:fld>
             <a:endParaRPr lang="ru-RU"/>
           </a:p>
@@ -660,7 +676,7 @@
           <a:p>
             <a:fld id="{50286413-5449-47E4-B1FF-6B5C4CB35255}" type="datetimeFigureOut">
               <a:rPr lang="ru-RU" smtClean="0"/>
-              <a:t>13.12.2022</a:t>
+              <a:t>10.01.2023</a:t>
             </a:fld>
             <a:endParaRPr lang="ru-RU"/>
           </a:p>
@@ -858,7 +874,7 @@
           <a:p>
             <a:fld id="{50286413-5449-47E4-B1FF-6B5C4CB35255}" type="datetimeFigureOut">
               <a:rPr lang="ru-RU" smtClean="0"/>
-              <a:t>13.12.2022</a:t>
+              <a:t>10.01.2023</a:t>
             </a:fld>
             <a:endParaRPr lang="ru-RU"/>
           </a:p>
@@ -1133,7 +1149,7 @@
           <a:p>
             <a:fld id="{50286413-5449-47E4-B1FF-6B5C4CB35255}" type="datetimeFigureOut">
               <a:rPr lang="ru-RU" smtClean="0"/>
-              <a:t>13.12.2022</a:t>
+              <a:t>10.01.2023</a:t>
             </a:fld>
             <a:endParaRPr lang="ru-RU"/>
           </a:p>
@@ -1398,7 +1414,7 @@
           <a:p>
             <a:fld id="{50286413-5449-47E4-B1FF-6B5C4CB35255}" type="datetimeFigureOut">
               <a:rPr lang="ru-RU" smtClean="0"/>
-              <a:t>13.12.2022</a:t>
+              <a:t>10.01.2023</a:t>
             </a:fld>
             <a:endParaRPr lang="ru-RU"/>
           </a:p>
@@ -1810,7 +1826,7 @@
           <a:p>
             <a:fld id="{50286413-5449-47E4-B1FF-6B5C4CB35255}" type="datetimeFigureOut">
               <a:rPr lang="ru-RU" smtClean="0"/>
-              <a:t>13.12.2022</a:t>
+              <a:t>10.01.2023</a:t>
             </a:fld>
             <a:endParaRPr lang="ru-RU"/>
           </a:p>
@@ -1951,7 +1967,7 @@
           <a:p>
             <a:fld id="{50286413-5449-47E4-B1FF-6B5C4CB35255}" type="datetimeFigureOut">
               <a:rPr lang="ru-RU" smtClean="0"/>
-              <a:t>13.12.2022</a:t>
+              <a:t>10.01.2023</a:t>
             </a:fld>
             <a:endParaRPr lang="ru-RU"/>
           </a:p>
@@ -2064,7 +2080,7 @@
           <a:p>
             <a:fld id="{50286413-5449-47E4-B1FF-6B5C4CB35255}" type="datetimeFigureOut">
               <a:rPr lang="ru-RU" smtClean="0"/>
-              <a:t>13.12.2022</a:t>
+              <a:t>10.01.2023</a:t>
             </a:fld>
             <a:endParaRPr lang="ru-RU"/>
           </a:p>
@@ -2375,7 +2391,7 @@
           <a:p>
             <a:fld id="{50286413-5449-47E4-B1FF-6B5C4CB35255}" type="datetimeFigureOut">
               <a:rPr lang="ru-RU" smtClean="0"/>
-              <a:t>13.12.2022</a:t>
+              <a:t>10.01.2023</a:t>
             </a:fld>
             <a:endParaRPr lang="ru-RU"/>
           </a:p>
@@ -2663,7 +2679,7 @@
           <a:p>
             <a:fld id="{50286413-5449-47E4-B1FF-6B5C4CB35255}" type="datetimeFigureOut">
               <a:rPr lang="ru-RU" smtClean="0"/>
-              <a:t>13.12.2022</a:t>
+              <a:t>10.01.2023</a:t>
             </a:fld>
             <a:endParaRPr lang="ru-RU"/>
           </a:p>
@@ -2904,7 +2920,7 @@
           <a:p>
             <a:fld id="{50286413-5449-47E4-B1FF-6B5C4CB35255}" type="datetimeFigureOut">
               <a:rPr lang="ru-RU" smtClean="0"/>
-              <a:t>13.12.2022</a:t>
+              <a:t>10.01.2023</a:t>
             </a:fld>
             <a:endParaRPr lang="ru-RU"/>
           </a:p>
@@ -3342,32 +3358,112 @@
           <a:bodyPr/>
           <a:lstStyle/>
           <a:p>
+            <a:r>
+              <a:rPr lang="ru-RU" dirty="0">
+                <a:latin typeface="Arial Black" panose="020B0A04020102020204" pitchFamily="34" charset="0"/>
+                <a:cs typeface="Arial" panose="020B0604020202020204" pitchFamily="34" charset="0"/>
+              </a:rPr>
+              <a:t>Дерево </a:t>
+            </a:r>
+            <a:r>
+              <a:rPr lang="en-US" dirty="0">
+                <a:latin typeface="Arial Black" panose="020B0A04020102020204" pitchFamily="34" charset="0"/>
+                <a:cs typeface="Arial" panose="020B0604020202020204" pitchFamily="34" charset="0"/>
+              </a:rPr>
+              <a:t>van </a:t>
+            </a:r>
+            <a:r>
+              <a:rPr lang="en-US" dirty="0" err="1">
+                <a:latin typeface="Arial Black" panose="020B0A04020102020204" pitchFamily="34" charset="0"/>
+                <a:cs typeface="Arial" panose="020B0604020202020204" pitchFamily="34" charset="0"/>
+              </a:rPr>
+              <a:t>Emde</a:t>
+            </a:r>
+            <a:r>
+              <a:rPr lang="en-US" dirty="0">
+                <a:latin typeface="Arial Black" panose="020B0A04020102020204" pitchFamily="34" charset="0"/>
+                <a:cs typeface="Arial" panose="020B0604020202020204" pitchFamily="34" charset="0"/>
+              </a:rPr>
+              <a:t> Boas</a:t>
+            </a:r>
+            <a:endParaRPr lang="ru-RU" dirty="0">
+              <a:latin typeface="Arial Black" panose="020B0A04020102020204" pitchFamily="34" charset="0"/>
+              <a:cs typeface="Arial" panose="020B0604020202020204" pitchFamily="34" charset="0"/>
+            </a:endParaRPr>
+          </a:p>
+        </p:txBody>
+      </p:sp>
+      <p:sp>
+        <p:nvSpPr>
+          <p:cNvPr id="3" name="Подзаголовок 2">
+            <a:extLst>
+              <a:ext uri="{FF2B5EF4-FFF2-40B4-BE49-F238E27FC236}">
+                <a16:creationId xmlns:a16="http://schemas.microsoft.com/office/drawing/2014/main" id="{E5230E77-7C3D-498C-A9F3-93DF7C108E53}"/>
+              </a:ext>
+            </a:extLst>
+          </p:cNvPr>
+          <p:cNvSpPr>
+            <a:spLocks noGrp="1"/>
+          </p:cNvSpPr>
+          <p:nvPr>
+            <p:ph type="subTitle" idx="1"/>
+          </p:nvPr>
+        </p:nvSpPr>
+        <p:spPr/>
+        <p:txBody>
+          <a:bodyPr>
+            <a:normAutofit lnSpcReduction="10000"/>
+          </a:bodyPr>
+          <a:lstStyle/>
+          <a:p>
+            <a:pPr algn="r"/>
+            <a:r>
+              <a:rPr lang="ru-RU" dirty="0">
+                <a:latin typeface="Arial" panose="020B0604020202020204" pitchFamily="34" charset="0"/>
+                <a:cs typeface="Arial" panose="020B0604020202020204" pitchFamily="34" charset="0"/>
+              </a:rPr>
+              <a:t>Выполнил</a:t>
+            </a:r>
+            <a:r>
+              <a:rPr lang="en-US" dirty="0">
+                <a:latin typeface="Arial" panose="020B0604020202020204" pitchFamily="34" charset="0"/>
+                <a:cs typeface="Arial" panose="020B0604020202020204" pitchFamily="34" charset="0"/>
+              </a:rPr>
+              <a:t>:</a:t>
+            </a:r>
+          </a:p>
+          <a:p>
+            <a:pPr algn="r"/>
+            <a:r>
+              <a:rPr lang="ru-RU" dirty="0">
+                <a:latin typeface="Arial" panose="020B0604020202020204" pitchFamily="34" charset="0"/>
+                <a:cs typeface="Arial" panose="020B0604020202020204" pitchFamily="34" charset="0"/>
+              </a:rPr>
+              <a:t>Студент группы</a:t>
+            </a:r>
+          </a:p>
+          <a:p>
+            <a:pPr algn="r"/>
+            <a:r>
+              <a:rPr lang="ru-RU" dirty="0">
+                <a:latin typeface="Arial" panose="020B0604020202020204" pitchFamily="34" charset="0"/>
+                <a:cs typeface="Arial" panose="020B0604020202020204" pitchFamily="34" charset="0"/>
+              </a:rPr>
+              <a:t>Б9121-09.03.03пикд</a:t>
+            </a:r>
+          </a:p>
+          <a:p>
+            <a:pPr algn="r"/>
+            <a:r>
+              <a:rPr lang="ru-RU" dirty="0">
+                <a:latin typeface="Arial" panose="020B0604020202020204" pitchFamily="34" charset="0"/>
+                <a:cs typeface="Arial" panose="020B0604020202020204" pitchFamily="34" charset="0"/>
+              </a:rPr>
+              <a:t>Борик Роман Дмитриевич</a:t>
+            </a:r>
+          </a:p>
+          <a:p>
             <a:endParaRPr lang="ru-RU" dirty="0"/>
-          </a:p>
-        </p:txBody>
-      </p:sp>
-      <p:sp>
-        <p:nvSpPr>
-          <p:cNvPr id="3" name="Подзаголовок 2">
-            <a:extLst>
-              <a:ext uri="{FF2B5EF4-FFF2-40B4-BE49-F238E27FC236}">
-                <a16:creationId xmlns:a16="http://schemas.microsoft.com/office/drawing/2014/main" id="{E5230E77-7C3D-498C-A9F3-93DF7C108E53}"/>
-              </a:ext>
-            </a:extLst>
-          </p:cNvPr>
-          <p:cNvSpPr>
-            <a:spLocks noGrp="1"/>
-          </p:cNvSpPr>
-          <p:nvPr>
-            <p:ph type="subTitle" idx="1"/>
-          </p:nvPr>
-        </p:nvSpPr>
-        <p:spPr/>
-        <p:txBody>
-          <a:bodyPr/>
-          <a:lstStyle/>
-          <a:p>
-            <a:endParaRPr lang="ru-RU"/>
           </a:p>
         </p:txBody>
       </p:sp>
@@ -3375,6 +3471,1324 @@
     <p:extLst>
       <p:ext uri="{BB962C8B-B14F-4D97-AF65-F5344CB8AC3E}">
         <p14:creationId xmlns:p14="http://schemas.microsoft.com/office/powerpoint/2010/main" val="1703043570"/>
+      </p:ext>
+    </p:extLst>
+  </p:cSld>
+  <p:clrMapOvr>
+    <a:masterClrMapping/>
+  </p:clrMapOvr>
+</p:sld>
+</file>
+
+<file path=ppt/slides/slide10.xml><?xml version="1.0" encoding="utf-8"?>
+<p:sld xmlns:a="http://schemas.openxmlformats.org/drawingml/2006/main" xmlns:r="http://schemas.openxmlformats.org/officeDocument/2006/relationships" xmlns:p="http://schemas.openxmlformats.org/presentationml/2006/main">
+  <p:cSld>
+    <p:spTree>
+      <p:nvGrpSpPr>
+        <p:cNvPr id="1" name=""/>
+        <p:cNvGrpSpPr/>
+        <p:nvPr/>
+      </p:nvGrpSpPr>
+      <p:grpSpPr>
+        <a:xfrm>
+          <a:off x="0" y="0"/>
+          <a:ext cx="0" cy="0"/>
+          <a:chOff x="0" y="0"/>
+          <a:chExt cx="0" cy="0"/>
+        </a:xfrm>
+      </p:grpSpPr>
+      <p:sp>
+        <p:nvSpPr>
+          <p:cNvPr id="2" name="Заголовок 1">
+            <a:extLst>
+              <a:ext uri="{FF2B5EF4-FFF2-40B4-BE49-F238E27FC236}">
+                <a16:creationId xmlns:a16="http://schemas.microsoft.com/office/drawing/2014/main" id="{55BD7F8A-1437-411C-9F55-68BDC56C8E9C}"/>
+              </a:ext>
+            </a:extLst>
+          </p:cNvPr>
+          <p:cNvSpPr>
+            <a:spLocks noGrp="1"/>
+          </p:cNvSpPr>
+          <p:nvPr>
+            <p:ph type="title"/>
+          </p:nvPr>
+        </p:nvSpPr>
+        <p:spPr/>
+        <p:txBody>
+          <a:bodyPr/>
+          <a:lstStyle/>
+          <a:p>
+            <a:r>
+              <a:rPr lang="en-US" dirty="0"/>
+              <a:t>Remove</a:t>
+            </a:r>
+            <a:endParaRPr lang="ru-RU" dirty="0"/>
+          </a:p>
+        </p:txBody>
+      </p:sp>
+      <p:sp>
+        <p:nvSpPr>
+          <p:cNvPr id="3" name="Объект 2">
+            <a:extLst>
+              <a:ext uri="{FF2B5EF4-FFF2-40B4-BE49-F238E27FC236}">
+                <a16:creationId xmlns:a16="http://schemas.microsoft.com/office/drawing/2014/main" id="{ACDD2A56-C598-4DAC-ACAD-FC11562E424E}"/>
+              </a:ext>
+            </a:extLst>
+          </p:cNvPr>
+          <p:cNvSpPr>
+            <a:spLocks noGrp="1"/>
+          </p:cNvSpPr>
+          <p:nvPr>
+            <p:ph idx="1"/>
+          </p:nvPr>
+        </p:nvSpPr>
+        <p:spPr/>
+        <p:txBody>
+          <a:bodyPr/>
+          <a:lstStyle/>
+          <a:p>
+            <a:endParaRPr lang="ru-RU"/>
+          </a:p>
+        </p:txBody>
+      </p:sp>
+    </p:spTree>
+    <p:extLst>
+      <p:ext uri="{BB962C8B-B14F-4D97-AF65-F5344CB8AC3E}">
+        <p14:creationId xmlns:p14="http://schemas.microsoft.com/office/powerpoint/2010/main" val="3192810081"/>
+      </p:ext>
+    </p:extLst>
+  </p:cSld>
+  <p:clrMapOvr>
+    <a:masterClrMapping/>
+  </p:clrMapOvr>
+</p:sld>
+</file>
+
+<file path=ppt/slides/slide11.xml><?xml version="1.0" encoding="utf-8"?>
+<p:sld xmlns:a="http://schemas.openxmlformats.org/drawingml/2006/main" xmlns:r="http://schemas.openxmlformats.org/officeDocument/2006/relationships" xmlns:p="http://schemas.openxmlformats.org/presentationml/2006/main">
+  <p:cSld>
+    <p:spTree>
+      <p:nvGrpSpPr>
+        <p:cNvPr id="1" name=""/>
+        <p:cNvGrpSpPr/>
+        <p:nvPr/>
+      </p:nvGrpSpPr>
+      <p:grpSpPr>
+        <a:xfrm>
+          <a:off x="0" y="0"/>
+          <a:ext cx="0" cy="0"/>
+          <a:chOff x="0" y="0"/>
+          <a:chExt cx="0" cy="0"/>
+        </a:xfrm>
+      </p:grpSpPr>
+      <p:sp>
+        <p:nvSpPr>
+          <p:cNvPr id="2" name="Заголовок 1">
+            <a:extLst>
+              <a:ext uri="{FF2B5EF4-FFF2-40B4-BE49-F238E27FC236}">
+                <a16:creationId xmlns:a16="http://schemas.microsoft.com/office/drawing/2014/main" id="{C6987F26-A561-46A7-A3EE-42313CC25430}"/>
+              </a:ext>
+            </a:extLst>
+          </p:cNvPr>
+          <p:cNvSpPr>
+            <a:spLocks noGrp="1"/>
+          </p:cNvSpPr>
+          <p:nvPr>
+            <p:ph type="title"/>
+          </p:nvPr>
+        </p:nvSpPr>
+        <p:spPr/>
+        <p:txBody>
+          <a:bodyPr/>
+          <a:lstStyle/>
+          <a:p>
+            <a:r>
+              <a:rPr lang="en-US" dirty="0" err="1"/>
+              <a:t>SuccessorVEB</a:t>
+            </a:r>
+            <a:endParaRPr lang="ru-RU" dirty="0"/>
+          </a:p>
+        </p:txBody>
+      </p:sp>
+      <p:sp>
+        <p:nvSpPr>
+          <p:cNvPr id="3" name="Объект 2">
+            <a:extLst>
+              <a:ext uri="{FF2B5EF4-FFF2-40B4-BE49-F238E27FC236}">
+                <a16:creationId xmlns:a16="http://schemas.microsoft.com/office/drawing/2014/main" id="{DB4B1FC0-79DB-4368-9C59-A84CE5249690}"/>
+              </a:ext>
+            </a:extLst>
+          </p:cNvPr>
+          <p:cNvSpPr>
+            <a:spLocks noGrp="1"/>
+          </p:cNvSpPr>
+          <p:nvPr>
+            <p:ph idx="1"/>
+          </p:nvPr>
+        </p:nvSpPr>
+        <p:spPr/>
+        <p:txBody>
+          <a:bodyPr/>
+          <a:lstStyle/>
+          <a:p>
+            <a:endParaRPr lang="ru-RU"/>
+          </a:p>
+        </p:txBody>
+      </p:sp>
+    </p:spTree>
+    <p:extLst>
+      <p:ext uri="{BB962C8B-B14F-4D97-AF65-F5344CB8AC3E}">
+        <p14:creationId xmlns:p14="http://schemas.microsoft.com/office/powerpoint/2010/main" val="3795284225"/>
+      </p:ext>
+    </p:extLst>
+  </p:cSld>
+  <p:clrMapOvr>
+    <a:masterClrMapping/>
+  </p:clrMapOvr>
+</p:sld>
+</file>
+
+<file path=ppt/slides/slide12.xml><?xml version="1.0" encoding="utf-8"?>
+<p:sld xmlns:a="http://schemas.openxmlformats.org/drawingml/2006/main" xmlns:r="http://schemas.openxmlformats.org/officeDocument/2006/relationships" xmlns:p="http://schemas.openxmlformats.org/presentationml/2006/main">
+  <p:cSld>
+    <p:spTree>
+      <p:nvGrpSpPr>
+        <p:cNvPr id="1" name=""/>
+        <p:cNvGrpSpPr/>
+        <p:nvPr/>
+      </p:nvGrpSpPr>
+      <p:grpSpPr>
+        <a:xfrm>
+          <a:off x="0" y="0"/>
+          <a:ext cx="0" cy="0"/>
+          <a:chOff x="0" y="0"/>
+          <a:chExt cx="0" cy="0"/>
+        </a:xfrm>
+      </p:grpSpPr>
+      <p:sp>
+        <p:nvSpPr>
+          <p:cNvPr id="2" name="Заголовок 1">
+            <a:extLst>
+              <a:ext uri="{FF2B5EF4-FFF2-40B4-BE49-F238E27FC236}">
+                <a16:creationId xmlns:a16="http://schemas.microsoft.com/office/drawing/2014/main" id="{A1948E5B-DE53-40FF-A096-99590B6B0871}"/>
+              </a:ext>
+            </a:extLst>
+          </p:cNvPr>
+          <p:cNvSpPr>
+            <a:spLocks noGrp="1"/>
+          </p:cNvSpPr>
+          <p:nvPr>
+            <p:ph type="title"/>
+          </p:nvPr>
+        </p:nvSpPr>
+        <p:spPr/>
+        <p:txBody>
+          <a:bodyPr/>
+          <a:lstStyle/>
+          <a:p>
+            <a:r>
+              <a:rPr lang="en-US" dirty="0" err="1"/>
+              <a:t>PredecessorVEB</a:t>
+            </a:r>
+            <a:endParaRPr lang="ru-RU" dirty="0"/>
+          </a:p>
+        </p:txBody>
+      </p:sp>
+      <p:sp>
+        <p:nvSpPr>
+          <p:cNvPr id="3" name="Объект 2">
+            <a:extLst>
+              <a:ext uri="{FF2B5EF4-FFF2-40B4-BE49-F238E27FC236}">
+                <a16:creationId xmlns:a16="http://schemas.microsoft.com/office/drawing/2014/main" id="{E8BE0739-A2BB-4612-84C9-EAF328B650E1}"/>
+              </a:ext>
+            </a:extLst>
+          </p:cNvPr>
+          <p:cNvSpPr>
+            <a:spLocks noGrp="1"/>
+          </p:cNvSpPr>
+          <p:nvPr>
+            <p:ph idx="1"/>
+          </p:nvPr>
+        </p:nvSpPr>
+        <p:spPr/>
+        <p:txBody>
+          <a:bodyPr/>
+          <a:lstStyle/>
+          <a:p>
+            <a:endParaRPr lang="ru-RU"/>
+          </a:p>
+        </p:txBody>
+      </p:sp>
+    </p:spTree>
+    <p:extLst>
+      <p:ext uri="{BB962C8B-B14F-4D97-AF65-F5344CB8AC3E}">
+        <p14:creationId xmlns:p14="http://schemas.microsoft.com/office/powerpoint/2010/main" val="3588413207"/>
+      </p:ext>
+    </p:extLst>
+  </p:cSld>
+  <p:clrMapOvr>
+    <a:masterClrMapping/>
+  </p:clrMapOvr>
+</p:sld>
+</file>
+
+<file path=ppt/slides/slide2.xml><?xml version="1.0" encoding="utf-8"?>
+<p:sld xmlns:a="http://schemas.openxmlformats.org/drawingml/2006/main" xmlns:r="http://schemas.openxmlformats.org/officeDocument/2006/relationships" xmlns:p="http://schemas.openxmlformats.org/presentationml/2006/main">
+  <p:cSld>
+    <p:spTree>
+      <p:nvGrpSpPr>
+        <p:cNvPr id="1" name=""/>
+        <p:cNvGrpSpPr/>
+        <p:nvPr/>
+      </p:nvGrpSpPr>
+      <p:grpSpPr>
+        <a:xfrm>
+          <a:off x="0" y="0"/>
+          <a:ext cx="0" cy="0"/>
+          <a:chOff x="0" y="0"/>
+          <a:chExt cx="0" cy="0"/>
+        </a:xfrm>
+      </p:grpSpPr>
+      <p:sp>
+        <p:nvSpPr>
+          <p:cNvPr id="2" name="Заголовок 1">
+            <a:extLst>
+              <a:ext uri="{FF2B5EF4-FFF2-40B4-BE49-F238E27FC236}">
+                <a16:creationId xmlns:a16="http://schemas.microsoft.com/office/drawing/2014/main" id="{4AA8A97E-339E-469F-A793-A393D5ACBFB6}"/>
+              </a:ext>
+            </a:extLst>
+          </p:cNvPr>
+          <p:cNvSpPr>
+            <a:spLocks noGrp="1"/>
+          </p:cNvSpPr>
+          <p:nvPr>
+            <p:ph type="title"/>
+          </p:nvPr>
+        </p:nvSpPr>
+        <p:spPr/>
+        <p:txBody>
+          <a:bodyPr/>
+          <a:lstStyle/>
+          <a:p>
+            <a:r>
+              <a:rPr lang="ru-RU" dirty="0">
+                <a:latin typeface="Arial Black" panose="020B0A04020102020204" pitchFamily="34" charset="0"/>
+              </a:rPr>
+              <a:t>Дерево </a:t>
+            </a:r>
+            <a:r>
+              <a:rPr lang="ru-RU" dirty="0" err="1">
+                <a:latin typeface="Arial Black" panose="020B0A04020102020204" pitchFamily="34" charset="0"/>
+              </a:rPr>
+              <a:t>ван</a:t>
+            </a:r>
+            <a:r>
+              <a:rPr lang="ru-RU" dirty="0">
+                <a:latin typeface="Arial Black" panose="020B0A04020102020204" pitchFamily="34" charset="0"/>
+              </a:rPr>
+              <a:t> </a:t>
+            </a:r>
+            <a:r>
+              <a:rPr lang="ru-RU" dirty="0" err="1">
+                <a:latin typeface="Arial Black" panose="020B0A04020102020204" pitchFamily="34" charset="0"/>
+              </a:rPr>
+              <a:t>Эмде</a:t>
+            </a:r>
+            <a:r>
+              <a:rPr lang="ru-RU" dirty="0">
+                <a:latin typeface="Arial Black" panose="020B0A04020102020204" pitchFamily="34" charset="0"/>
+              </a:rPr>
+              <a:t> </a:t>
+            </a:r>
+            <a:r>
+              <a:rPr lang="ru-RU" dirty="0" err="1">
+                <a:latin typeface="Arial Black" panose="020B0A04020102020204" pitchFamily="34" charset="0"/>
+              </a:rPr>
+              <a:t>Боасса</a:t>
+            </a:r>
+            <a:endParaRPr lang="ru-RU" dirty="0">
+              <a:latin typeface="Arial Black" panose="020B0A04020102020204" pitchFamily="34" charset="0"/>
+            </a:endParaRPr>
+          </a:p>
+        </p:txBody>
+      </p:sp>
+      <p:sp>
+        <p:nvSpPr>
+          <p:cNvPr id="3" name="Объект 2">
+            <a:extLst>
+              <a:ext uri="{FF2B5EF4-FFF2-40B4-BE49-F238E27FC236}">
+                <a16:creationId xmlns:a16="http://schemas.microsoft.com/office/drawing/2014/main" id="{CE5F15CC-3AD2-4E7C-BD6F-1194A1FB2F5C}"/>
+              </a:ext>
+            </a:extLst>
+          </p:cNvPr>
+          <p:cNvSpPr>
+            <a:spLocks noGrp="1"/>
+          </p:cNvSpPr>
+          <p:nvPr>
+            <p:ph idx="1"/>
+          </p:nvPr>
+        </p:nvSpPr>
+        <p:spPr/>
+        <p:txBody>
+          <a:bodyPr/>
+          <a:lstStyle/>
+          <a:p>
+            <a:r>
+              <a:rPr lang="ru-RU" dirty="0">
+                <a:latin typeface="Arial" panose="020B0604020202020204" pitchFamily="34" charset="0"/>
+                <a:cs typeface="Arial" panose="020B0604020202020204" pitchFamily="34" charset="0"/>
+              </a:rPr>
+              <a:t>Хранит числа в диапазоне </a:t>
+            </a:r>
+            <a:r>
+              <a:rPr lang="en-US" dirty="0">
+                <a:latin typeface="Arial" panose="020B0604020202020204" pitchFamily="34" charset="0"/>
+                <a:cs typeface="Arial" panose="020B0604020202020204" pitchFamily="34" charset="0"/>
+              </a:rPr>
+              <a:t>[0, U], </a:t>
+            </a:r>
+            <a:r>
+              <a:rPr lang="ru-RU" dirty="0">
+                <a:latin typeface="Arial" panose="020B0604020202020204" pitchFamily="34" charset="0"/>
+                <a:cs typeface="Arial" panose="020B0604020202020204" pitchFamily="34" charset="0"/>
+              </a:rPr>
+              <a:t>где </a:t>
+            </a:r>
+            <a:r>
+              <a:rPr lang="en-US" dirty="0">
+                <a:latin typeface="Arial" panose="020B0604020202020204" pitchFamily="34" charset="0"/>
+                <a:cs typeface="Arial" panose="020B0604020202020204" pitchFamily="34" charset="0"/>
+              </a:rPr>
+              <a:t>U – </a:t>
+            </a:r>
+            <a:r>
+              <a:rPr lang="ru-RU" dirty="0">
+                <a:latin typeface="Arial" panose="020B0604020202020204" pitchFamily="34" charset="0"/>
+                <a:cs typeface="Arial" panose="020B0604020202020204" pitchFamily="34" charset="0"/>
+              </a:rPr>
+              <a:t>число вида 2</a:t>
+            </a:r>
+            <a:r>
+              <a:rPr lang="en-US" dirty="0">
+                <a:latin typeface="Arial" panose="020B0604020202020204" pitchFamily="34" charset="0"/>
+                <a:cs typeface="Arial" panose="020B0604020202020204" pitchFamily="34" charset="0"/>
+              </a:rPr>
+              <a:t>^k, </a:t>
+            </a:r>
+            <a:r>
+              <a:rPr lang="ru-RU" dirty="0">
+                <a:latin typeface="Arial" panose="020B0604020202020204" pitchFamily="34" charset="0"/>
+                <a:cs typeface="Arial" panose="020B0604020202020204" pitchFamily="34" charset="0"/>
+              </a:rPr>
+              <a:t>где</a:t>
+            </a:r>
+            <a:r>
+              <a:rPr lang="en-US" dirty="0">
+                <a:latin typeface="Arial" panose="020B0604020202020204" pitchFamily="34" charset="0"/>
+                <a:cs typeface="Arial" panose="020B0604020202020204" pitchFamily="34" charset="0"/>
+              </a:rPr>
+              <a:t> k –</a:t>
+            </a:r>
+            <a:r>
+              <a:rPr lang="ru-RU" dirty="0">
+                <a:latin typeface="Arial" panose="020B0604020202020204" pitchFamily="34" charset="0"/>
+                <a:cs typeface="Arial" panose="020B0604020202020204" pitchFamily="34" charset="0"/>
+              </a:rPr>
+              <a:t> </a:t>
+            </a:r>
+            <a:r>
+              <a:rPr lang="ru-RU">
+                <a:latin typeface="Arial" panose="020B0604020202020204" pitchFamily="34" charset="0"/>
+                <a:cs typeface="Arial" panose="020B0604020202020204" pitchFamily="34" charset="0"/>
+              </a:rPr>
+              <a:t>количество бит</a:t>
+            </a:r>
+            <a:endParaRPr lang="ru-RU" dirty="0">
+              <a:latin typeface="Arial" panose="020B0604020202020204" pitchFamily="34" charset="0"/>
+              <a:cs typeface="Arial" panose="020B0604020202020204" pitchFamily="34" charset="0"/>
+            </a:endParaRPr>
+          </a:p>
+        </p:txBody>
+      </p:sp>
+    </p:spTree>
+    <p:extLst>
+      <p:ext uri="{BB962C8B-B14F-4D97-AF65-F5344CB8AC3E}">
+        <p14:creationId xmlns:p14="http://schemas.microsoft.com/office/powerpoint/2010/main" val="253432182"/>
+      </p:ext>
+    </p:extLst>
+  </p:cSld>
+  <p:clrMapOvr>
+    <a:masterClrMapping/>
+  </p:clrMapOvr>
+</p:sld>
+</file>
+
+<file path=ppt/slides/slide3.xml><?xml version="1.0" encoding="utf-8"?>
+<p:sld xmlns:a="http://schemas.openxmlformats.org/drawingml/2006/main" xmlns:r="http://schemas.openxmlformats.org/officeDocument/2006/relationships" xmlns:p="http://schemas.openxmlformats.org/presentationml/2006/main">
+  <p:cSld>
+    <p:spTree>
+      <p:nvGrpSpPr>
+        <p:cNvPr id="1" name=""/>
+        <p:cNvGrpSpPr/>
+        <p:nvPr/>
+      </p:nvGrpSpPr>
+      <p:grpSpPr>
+        <a:xfrm>
+          <a:off x="0" y="0"/>
+          <a:ext cx="0" cy="0"/>
+          <a:chOff x="0" y="0"/>
+          <a:chExt cx="0" cy="0"/>
+        </a:xfrm>
+      </p:grpSpPr>
+      <p:sp>
+        <p:nvSpPr>
+          <p:cNvPr id="2" name="Заголовок 1">
+            <a:extLst>
+              <a:ext uri="{FF2B5EF4-FFF2-40B4-BE49-F238E27FC236}">
+                <a16:creationId xmlns:a16="http://schemas.microsoft.com/office/drawing/2014/main" id="{20EC5C04-E2C2-422B-AC3E-D7FB6198F300}"/>
+              </a:ext>
+            </a:extLst>
+          </p:cNvPr>
+          <p:cNvSpPr>
+            <a:spLocks noGrp="1"/>
+          </p:cNvSpPr>
+          <p:nvPr>
+            <p:ph type="title"/>
+          </p:nvPr>
+        </p:nvSpPr>
+        <p:spPr/>
+        <p:txBody>
+          <a:bodyPr/>
+          <a:lstStyle/>
+          <a:p>
+            <a:r>
+              <a:rPr lang="ru-RU" dirty="0">
+                <a:latin typeface="Arial Black" panose="020B0A04020102020204" pitchFamily="34" charset="0"/>
+              </a:rPr>
+              <a:t>Использование</a:t>
+            </a:r>
+          </a:p>
+        </p:txBody>
+      </p:sp>
+      <p:sp>
+        <p:nvSpPr>
+          <p:cNvPr id="3" name="Объект 2">
+            <a:extLst>
+              <a:ext uri="{FF2B5EF4-FFF2-40B4-BE49-F238E27FC236}">
+                <a16:creationId xmlns:a16="http://schemas.microsoft.com/office/drawing/2014/main" id="{3C684CAC-CCAF-48B3-80CF-704D21189FA9}"/>
+              </a:ext>
+            </a:extLst>
+          </p:cNvPr>
+          <p:cNvSpPr>
+            <a:spLocks noGrp="1"/>
+          </p:cNvSpPr>
+          <p:nvPr>
+            <p:ph idx="1"/>
+          </p:nvPr>
+        </p:nvSpPr>
+        <p:spPr/>
+        <p:txBody>
+          <a:bodyPr/>
+          <a:lstStyle/>
+          <a:p>
+            <a:r>
+              <a:rPr lang="ru-RU" dirty="0">
+                <a:latin typeface="Arial" panose="020B0604020202020204" pitchFamily="34" charset="0"/>
+                <a:cs typeface="Arial" panose="020B0604020202020204" pitchFamily="34" charset="0"/>
+              </a:rPr>
+              <a:t>Там же где и двоичные деревья поиска</a:t>
+            </a:r>
+          </a:p>
+        </p:txBody>
+      </p:sp>
+    </p:spTree>
+    <p:extLst>
+      <p:ext uri="{BB962C8B-B14F-4D97-AF65-F5344CB8AC3E}">
+        <p14:creationId xmlns:p14="http://schemas.microsoft.com/office/powerpoint/2010/main" val="2278429103"/>
+      </p:ext>
+    </p:extLst>
+  </p:cSld>
+  <p:clrMapOvr>
+    <a:masterClrMapping/>
+  </p:clrMapOvr>
+</p:sld>
+</file>
+
+<file path=ppt/slides/slide4.xml><?xml version="1.0" encoding="utf-8"?>
+<p:sld xmlns:a="http://schemas.openxmlformats.org/drawingml/2006/main" xmlns:r="http://schemas.openxmlformats.org/officeDocument/2006/relationships" xmlns:p="http://schemas.openxmlformats.org/presentationml/2006/main">
+  <p:cSld>
+    <p:spTree>
+      <p:nvGrpSpPr>
+        <p:cNvPr id="1" name=""/>
+        <p:cNvGrpSpPr/>
+        <p:nvPr/>
+      </p:nvGrpSpPr>
+      <p:grpSpPr>
+        <a:xfrm>
+          <a:off x="0" y="0"/>
+          <a:ext cx="0" cy="0"/>
+          <a:chOff x="0" y="0"/>
+          <a:chExt cx="0" cy="0"/>
+        </a:xfrm>
+      </p:grpSpPr>
+      <p:sp>
+        <p:nvSpPr>
+          <p:cNvPr id="2" name="Заголовок 1">
+            <a:extLst>
+              <a:ext uri="{FF2B5EF4-FFF2-40B4-BE49-F238E27FC236}">
+                <a16:creationId xmlns:a16="http://schemas.microsoft.com/office/drawing/2014/main" id="{A0C4F38C-0AF6-4F03-8A5B-0435C6E6D28D}"/>
+              </a:ext>
+            </a:extLst>
+          </p:cNvPr>
+          <p:cNvSpPr>
+            <a:spLocks noGrp="1"/>
+          </p:cNvSpPr>
+          <p:nvPr>
+            <p:ph type="title"/>
+          </p:nvPr>
+        </p:nvSpPr>
+        <p:spPr/>
+        <p:txBody>
+          <a:bodyPr/>
+          <a:lstStyle/>
+          <a:p>
+            <a:r>
+              <a:rPr lang="ru-RU" dirty="0">
+                <a:latin typeface="Arial Black" panose="020B0A04020102020204" pitchFamily="34" charset="0"/>
+              </a:rPr>
+              <a:t>Недостатки</a:t>
+            </a:r>
+          </a:p>
+        </p:txBody>
+      </p:sp>
+      <p:sp>
+        <p:nvSpPr>
+          <p:cNvPr id="3" name="Объект 2">
+            <a:extLst>
+              <a:ext uri="{FF2B5EF4-FFF2-40B4-BE49-F238E27FC236}">
+                <a16:creationId xmlns:a16="http://schemas.microsoft.com/office/drawing/2014/main" id="{E591BEF2-9B23-47CD-8925-66FBB345DE7C}"/>
+              </a:ext>
+            </a:extLst>
+          </p:cNvPr>
+          <p:cNvSpPr>
+            <a:spLocks noGrp="1"/>
+          </p:cNvSpPr>
+          <p:nvPr>
+            <p:ph idx="1"/>
+          </p:nvPr>
+        </p:nvSpPr>
+        <p:spPr/>
+        <p:txBody>
+          <a:bodyPr/>
+          <a:lstStyle/>
+          <a:p>
+            <a:r>
+              <a:rPr lang="ru-RU" dirty="0">
+                <a:latin typeface="Arial" panose="020B0604020202020204" pitchFamily="34" charset="0"/>
+                <a:cs typeface="Arial" panose="020B0604020202020204" pitchFamily="34" charset="0"/>
+              </a:rPr>
+              <a:t>Используемая память – </a:t>
+            </a:r>
+            <a:r>
+              <a:rPr lang="en-US" dirty="0">
+                <a:latin typeface="Arial" panose="020B0604020202020204" pitchFamily="34" charset="0"/>
+                <a:cs typeface="Arial" panose="020B0604020202020204" pitchFamily="34" charset="0"/>
+              </a:rPr>
+              <a:t>O(U)</a:t>
+            </a:r>
+          </a:p>
+          <a:p>
+            <a:r>
+              <a:rPr lang="ru-RU" dirty="0">
+                <a:latin typeface="Arial" panose="020B0604020202020204" pitchFamily="34" charset="0"/>
+                <a:cs typeface="Arial" panose="020B0604020202020204" pitchFamily="34" charset="0"/>
+              </a:rPr>
+              <a:t>Хранит только положительные числа</a:t>
+            </a:r>
+          </a:p>
+        </p:txBody>
+      </p:sp>
+    </p:spTree>
+    <p:extLst>
+      <p:ext uri="{BB962C8B-B14F-4D97-AF65-F5344CB8AC3E}">
+        <p14:creationId xmlns:p14="http://schemas.microsoft.com/office/powerpoint/2010/main" val="2964491438"/>
+      </p:ext>
+    </p:extLst>
+  </p:cSld>
+  <p:clrMapOvr>
+    <a:masterClrMapping/>
+  </p:clrMapOvr>
+</p:sld>
+</file>
+
+<file path=ppt/slides/slide5.xml><?xml version="1.0" encoding="utf-8"?>
+<p:sld xmlns:a="http://schemas.openxmlformats.org/drawingml/2006/main" xmlns:r="http://schemas.openxmlformats.org/officeDocument/2006/relationships" xmlns:p="http://schemas.openxmlformats.org/presentationml/2006/main">
+  <p:cSld>
+    <p:spTree>
+      <p:nvGrpSpPr>
+        <p:cNvPr id="1" name=""/>
+        <p:cNvGrpSpPr/>
+        <p:nvPr/>
+      </p:nvGrpSpPr>
+      <p:grpSpPr>
+        <a:xfrm>
+          <a:off x="0" y="0"/>
+          <a:ext cx="0" cy="0"/>
+          <a:chOff x="0" y="0"/>
+          <a:chExt cx="0" cy="0"/>
+        </a:xfrm>
+      </p:grpSpPr>
+      <p:sp>
+        <p:nvSpPr>
+          <p:cNvPr id="2" name="Заголовок 1">
+            <a:extLst>
+              <a:ext uri="{FF2B5EF4-FFF2-40B4-BE49-F238E27FC236}">
+                <a16:creationId xmlns:a16="http://schemas.microsoft.com/office/drawing/2014/main" id="{35E038FD-5275-4690-9BE9-17EB235AB839}"/>
+              </a:ext>
+            </a:extLst>
+          </p:cNvPr>
+          <p:cNvSpPr>
+            <a:spLocks noGrp="1"/>
+          </p:cNvSpPr>
+          <p:nvPr>
+            <p:ph type="title"/>
+          </p:nvPr>
+        </p:nvSpPr>
+        <p:spPr/>
+        <p:txBody>
+          <a:bodyPr/>
+          <a:lstStyle/>
+          <a:p>
+            <a:r>
+              <a:rPr lang="ru-RU" dirty="0">
+                <a:latin typeface="Arial Black" panose="020B0A04020102020204" pitchFamily="34" charset="0"/>
+              </a:rPr>
+              <a:t>Операции</a:t>
+            </a:r>
+          </a:p>
+        </p:txBody>
+      </p:sp>
+      <p:sp>
+        <p:nvSpPr>
+          <p:cNvPr id="3" name="Объект 2">
+            <a:extLst>
+              <a:ext uri="{FF2B5EF4-FFF2-40B4-BE49-F238E27FC236}">
+                <a16:creationId xmlns:a16="http://schemas.microsoft.com/office/drawing/2014/main" id="{CCC227F0-EA12-4FA7-832B-28B31CA5F547}"/>
+              </a:ext>
+            </a:extLst>
+          </p:cNvPr>
+          <p:cNvSpPr>
+            <a:spLocks noGrp="1"/>
+          </p:cNvSpPr>
+          <p:nvPr>
+            <p:ph idx="1"/>
+          </p:nvPr>
+        </p:nvSpPr>
+        <p:spPr/>
+        <p:txBody>
+          <a:bodyPr/>
+          <a:lstStyle/>
+          <a:p>
+            <a:r>
+              <a:rPr lang="en-US" dirty="0">
+                <a:latin typeface="Arial" panose="020B0604020202020204" pitchFamily="34" charset="0"/>
+                <a:cs typeface="Arial" panose="020B0604020202020204" pitchFamily="34" charset="0"/>
+              </a:rPr>
+              <a:t>Minimum </a:t>
+            </a:r>
+            <a:r>
+              <a:rPr lang="ru-RU" dirty="0">
+                <a:latin typeface="Arial" panose="020B0604020202020204" pitchFamily="34" charset="0"/>
+                <a:cs typeface="Arial" panose="020B0604020202020204" pitchFamily="34" charset="0"/>
+              </a:rPr>
+              <a:t>и </a:t>
+            </a:r>
+            <a:r>
+              <a:rPr lang="en-US" dirty="0">
+                <a:latin typeface="Arial" panose="020B0604020202020204" pitchFamily="34" charset="0"/>
+                <a:cs typeface="Arial" panose="020B0604020202020204" pitchFamily="34" charset="0"/>
+              </a:rPr>
+              <a:t>maximum</a:t>
+            </a:r>
+            <a:r>
+              <a:rPr lang="ru-RU" dirty="0">
+                <a:latin typeface="Arial" panose="020B0604020202020204" pitchFamily="34" charset="0"/>
+                <a:cs typeface="Arial" panose="020B0604020202020204" pitchFamily="34" charset="0"/>
+              </a:rPr>
+              <a:t> – </a:t>
+            </a:r>
+            <a:r>
+              <a:rPr lang="en-US" dirty="0">
+                <a:latin typeface="Arial" panose="020B0604020202020204" pitchFamily="34" charset="0"/>
+                <a:cs typeface="Arial" panose="020B0604020202020204" pitchFamily="34" charset="0"/>
+              </a:rPr>
+              <a:t>O(</a:t>
+            </a:r>
+            <a:r>
+              <a:rPr lang="ru-RU" dirty="0">
+                <a:latin typeface="Arial" panose="020B0604020202020204" pitchFamily="34" charset="0"/>
+                <a:cs typeface="Arial" panose="020B0604020202020204" pitchFamily="34" charset="0"/>
+              </a:rPr>
+              <a:t>1)</a:t>
+            </a:r>
+          </a:p>
+          <a:p>
+            <a:r>
+              <a:rPr lang="en-US" dirty="0">
+                <a:latin typeface="Arial" panose="020B0604020202020204" pitchFamily="34" charset="0"/>
+                <a:cs typeface="Arial" panose="020B0604020202020204" pitchFamily="34" charset="0"/>
+              </a:rPr>
+              <a:t>Find</a:t>
+            </a:r>
+            <a:r>
+              <a:rPr lang="ru-RU" dirty="0">
+                <a:latin typeface="Arial" panose="020B0604020202020204" pitchFamily="34" charset="0"/>
+                <a:cs typeface="Arial" panose="020B0604020202020204" pitchFamily="34" charset="0"/>
+              </a:rPr>
+              <a:t> – </a:t>
+            </a:r>
+            <a:r>
+              <a:rPr lang="en-US" dirty="0">
+                <a:latin typeface="Arial" panose="020B0604020202020204" pitchFamily="34" charset="0"/>
+                <a:cs typeface="Arial" panose="020B0604020202020204" pitchFamily="34" charset="0"/>
+              </a:rPr>
+              <a:t>O(log(log(U)))</a:t>
+            </a:r>
+            <a:endParaRPr lang="ru-RU" dirty="0">
+              <a:latin typeface="Arial" panose="020B0604020202020204" pitchFamily="34" charset="0"/>
+              <a:cs typeface="Arial" panose="020B0604020202020204" pitchFamily="34" charset="0"/>
+            </a:endParaRPr>
+          </a:p>
+          <a:p>
+            <a:r>
+              <a:rPr lang="en-US" dirty="0">
+                <a:latin typeface="Arial" panose="020B0604020202020204" pitchFamily="34" charset="0"/>
+                <a:cs typeface="Arial" panose="020B0604020202020204" pitchFamily="34" charset="0"/>
+              </a:rPr>
+              <a:t>Insert </a:t>
+            </a:r>
+            <a:r>
+              <a:rPr lang="ru-RU" dirty="0">
+                <a:latin typeface="Arial" panose="020B0604020202020204" pitchFamily="34" charset="0"/>
+                <a:cs typeface="Arial" panose="020B0604020202020204" pitchFamily="34" charset="0"/>
+              </a:rPr>
+              <a:t>– </a:t>
+            </a:r>
+            <a:r>
+              <a:rPr lang="en-US" dirty="0">
+                <a:latin typeface="Arial" panose="020B0604020202020204" pitchFamily="34" charset="0"/>
+                <a:cs typeface="Arial" panose="020B0604020202020204" pitchFamily="34" charset="0"/>
+              </a:rPr>
+              <a:t>O(log(log(U)))</a:t>
+            </a:r>
+            <a:endParaRPr lang="ru-RU" dirty="0">
+              <a:latin typeface="Arial" panose="020B0604020202020204" pitchFamily="34" charset="0"/>
+              <a:cs typeface="Arial" panose="020B0604020202020204" pitchFamily="34" charset="0"/>
+            </a:endParaRPr>
+          </a:p>
+          <a:p>
+            <a:r>
+              <a:rPr lang="en-US" dirty="0">
+                <a:latin typeface="Arial" panose="020B0604020202020204" pitchFamily="34" charset="0"/>
+                <a:cs typeface="Arial" panose="020B0604020202020204" pitchFamily="34" charset="0"/>
+              </a:rPr>
+              <a:t>Remove</a:t>
+            </a:r>
+            <a:r>
+              <a:rPr lang="ru-RU" dirty="0">
+                <a:latin typeface="Arial" panose="020B0604020202020204" pitchFamily="34" charset="0"/>
+                <a:cs typeface="Arial" panose="020B0604020202020204" pitchFamily="34" charset="0"/>
+              </a:rPr>
+              <a:t>– </a:t>
+            </a:r>
+            <a:r>
+              <a:rPr lang="en-US" dirty="0">
+                <a:latin typeface="Arial" panose="020B0604020202020204" pitchFamily="34" charset="0"/>
+                <a:cs typeface="Arial" panose="020B0604020202020204" pitchFamily="34" charset="0"/>
+              </a:rPr>
+              <a:t>O(log(log(U)))</a:t>
+            </a:r>
+            <a:endParaRPr lang="ru-RU" dirty="0">
+              <a:latin typeface="Arial" panose="020B0604020202020204" pitchFamily="34" charset="0"/>
+              <a:cs typeface="Arial" panose="020B0604020202020204" pitchFamily="34" charset="0"/>
+            </a:endParaRPr>
+          </a:p>
+          <a:p>
+            <a:r>
+              <a:rPr lang="en-US" dirty="0" err="1">
+                <a:latin typeface="Arial" panose="020B0604020202020204" pitchFamily="34" charset="0"/>
+                <a:cs typeface="Arial" panose="020B0604020202020204" pitchFamily="34" charset="0"/>
+              </a:rPr>
+              <a:t>SuccessorVEB</a:t>
+            </a:r>
+            <a:r>
+              <a:rPr lang="en-US" dirty="0">
+                <a:latin typeface="Arial" panose="020B0604020202020204" pitchFamily="34" charset="0"/>
+                <a:cs typeface="Arial" panose="020B0604020202020204" pitchFamily="34" charset="0"/>
+              </a:rPr>
+              <a:t> </a:t>
+            </a:r>
+            <a:r>
+              <a:rPr lang="ru-RU" dirty="0">
+                <a:latin typeface="Arial" panose="020B0604020202020204" pitchFamily="34" charset="0"/>
+                <a:cs typeface="Arial" panose="020B0604020202020204" pitchFamily="34" charset="0"/>
+              </a:rPr>
+              <a:t>– </a:t>
+            </a:r>
+            <a:r>
+              <a:rPr lang="en-US" dirty="0">
+                <a:latin typeface="Arial" panose="020B0604020202020204" pitchFamily="34" charset="0"/>
+                <a:cs typeface="Arial" panose="020B0604020202020204" pitchFamily="34" charset="0"/>
+              </a:rPr>
+              <a:t>O(log(log(U)))</a:t>
+            </a:r>
+            <a:endParaRPr lang="ru-RU" dirty="0">
+              <a:latin typeface="Arial" panose="020B0604020202020204" pitchFamily="34" charset="0"/>
+              <a:cs typeface="Arial" panose="020B0604020202020204" pitchFamily="34" charset="0"/>
+            </a:endParaRPr>
+          </a:p>
+          <a:p>
+            <a:r>
+              <a:rPr lang="en-US" dirty="0" err="1">
+                <a:latin typeface="Arial" panose="020B0604020202020204" pitchFamily="34" charset="0"/>
+                <a:cs typeface="Arial" panose="020B0604020202020204" pitchFamily="34" charset="0"/>
+              </a:rPr>
+              <a:t>PredecessorVEB</a:t>
+            </a:r>
+            <a:r>
+              <a:rPr lang="ru-RU" dirty="0">
+                <a:latin typeface="Arial" panose="020B0604020202020204" pitchFamily="34" charset="0"/>
+                <a:cs typeface="Arial" panose="020B0604020202020204" pitchFamily="34" charset="0"/>
+              </a:rPr>
+              <a:t>– </a:t>
+            </a:r>
+            <a:r>
+              <a:rPr lang="en-US" dirty="0">
+                <a:latin typeface="Arial" panose="020B0604020202020204" pitchFamily="34" charset="0"/>
+                <a:cs typeface="Arial" panose="020B0604020202020204" pitchFamily="34" charset="0"/>
+              </a:rPr>
+              <a:t>O(log(log(U)))</a:t>
+            </a:r>
+            <a:endParaRPr lang="ru-RU" dirty="0">
+              <a:latin typeface="Arial" panose="020B0604020202020204" pitchFamily="34" charset="0"/>
+              <a:cs typeface="Arial" panose="020B0604020202020204" pitchFamily="34" charset="0"/>
+            </a:endParaRPr>
+          </a:p>
+          <a:p>
+            <a:endParaRPr lang="ru-RU" dirty="0"/>
+          </a:p>
+        </p:txBody>
+      </p:sp>
+    </p:spTree>
+    <p:extLst>
+      <p:ext uri="{BB962C8B-B14F-4D97-AF65-F5344CB8AC3E}">
+        <p14:creationId xmlns:p14="http://schemas.microsoft.com/office/powerpoint/2010/main" val="1526920276"/>
+      </p:ext>
+    </p:extLst>
+  </p:cSld>
+  <p:clrMapOvr>
+    <a:masterClrMapping/>
+  </p:clrMapOvr>
+</p:sld>
+</file>
+
+<file path=ppt/slides/slide6.xml><?xml version="1.0" encoding="utf-8"?>
+<p:sld xmlns:a="http://schemas.openxmlformats.org/drawingml/2006/main" xmlns:r="http://schemas.openxmlformats.org/officeDocument/2006/relationships" xmlns:p="http://schemas.openxmlformats.org/presentationml/2006/main">
+  <p:cSld>
+    <p:spTree>
+      <p:nvGrpSpPr>
+        <p:cNvPr id="1" name=""/>
+        <p:cNvGrpSpPr/>
+        <p:nvPr/>
+      </p:nvGrpSpPr>
+      <p:grpSpPr>
+        <a:xfrm>
+          <a:off x="0" y="0"/>
+          <a:ext cx="0" cy="0"/>
+          <a:chOff x="0" y="0"/>
+          <a:chExt cx="0" cy="0"/>
+        </a:xfrm>
+      </p:grpSpPr>
+      <p:sp>
+        <p:nvSpPr>
+          <p:cNvPr id="2" name="Заголовок 1">
+            <a:extLst>
+              <a:ext uri="{FF2B5EF4-FFF2-40B4-BE49-F238E27FC236}">
+                <a16:creationId xmlns:a16="http://schemas.microsoft.com/office/drawing/2014/main" id="{3C1E12A4-FE2A-42B8-B1A7-A26051D1AC29}"/>
+              </a:ext>
+            </a:extLst>
+          </p:cNvPr>
+          <p:cNvSpPr>
+            <a:spLocks noGrp="1"/>
+          </p:cNvSpPr>
+          <p:nvPr>
+            <p:ph type="title"/>
+          </p:nvPr>
+        </p:nvSpPr>
+        <p:spPr/>
+        <p:txBody>
+          <a:bodyPr/>
+          <a:lstStyle/>
+          <a:p>
+            <a:r>
+              <a:rPr lang="ru-RU" dirty="0">
+                <a:latin typeface="Arial Black" panose="020B0A04020102020204" pitchFamily="34" charset="0"/>
+              </a:rPr>
+              <a:t>Ограничения</a:t>
+            </a:r>
+          </a:p>
+        </p:txBody>
+      </p:sp>
+      <p:sp>
+        <p:nvSpPr>
+          <p:cNvPr id="3" name="Объект 2">
+            <a:extLst>
+              <a:ext uri="{FF2B5EF4-FFF2-40B4-BE49-F238E27FC236}">
+                <a16:creationId xmlns:a16="http://schemas.microsoft.com/office/drawing/2014/main" id="{EA13CC25-2EDB-44E2-8E66-77B94C8D1F97}"/>
+              </a:ext>
+            </a:extLst>
+          </p:cNvPr>
+          <p:cNvSpPr>
+            <a:spLocks noGrp="1"/>
+          </p:cNvSpPr>
+          <p:nvPr>
+            <p:ph idx="1"/>
+          </p:nvPr>
+        </p:nvSpPr>
+        <p:spPr/>
+        <p:txBody>
+          <a:bodyPr/>
+          <a:lstStyle/>
+          <a:p>
+            <a:r>
+              <a:rPr lang="ru-RU" dirty="0">
+                <a:latin typeface="Arial" panose="020B0604020202020204" pitchFamily="34" charset="0"/>
+                <a:cs typeface="Arial" panose="020B0604020202020204" pitchFamily="34" charset="0"/>
+              </a:rPr>
+              <a:t>Требуется корректность входных данных</a:t>
+            </a:r>
+          </a:p>
+          <a:p>
+            <a:r>
+              <a:rPr lang="ru-RU" dirty="0">
+                <a:latin typeface="Arial" panose="020B0604020202020204" pitchFamily="34" charset="0"/>
+                <a:cs typeface="Arial" panose="020B0604020202020204" pitchFamily="34" charset="0"/>
+              </a:rPr>
+              <a:t>Удаляемый элемент должен существовать</a:t>
+            </a:r>
+          </a:p>
+          <a:p>
+            <a:r>
+              <a:rPr lang="ru-RU" dirty="0">
+                <a:latin typeface="Arial" panose="020B0604020202020204" pitchFamily="34" charset="0"/>
+                <a:cs typeface="Arial" panose="020B0604020202020204" pitchFamily="34" charset="0"/>
+              </a:rPr>
+              <a:t>Размер дерева должен являться степенью двойки</a:t>
+            </a:r>
+          </a:p>
+        </p:txBody>
+      </p:sp>
+    </p:spTree>
+    <p:extLst>
+      <p:ext uri="{BB962C8B-B14F-4D97-AF65-F5344CB8AC3E}">
+        <p14:creationId xmlns:p14="http://schemas.microsoft.com/office/powerpoint/2010/main" val="4081147536"/>
+      </p:ext>
+    </p:extLst>
+  </p:cSld>
+  <p:clrMapOvr>
+    <a:masterClrMapping/>
+  </p:clrMapOvr>
+</p:sld>
+</file>
+
+<file path=ppt/slides/slide7.xml><?xml version="1.0" encoding="utf-8"?>
+<p:sld xmlns:a="http://schemas.openxmlformats.org/drawingml/2006/main" xmlns:r="http://schemas.openxmlformats.org/officeDocument/2006/relationships" xmlns:p="http://schemas.openxmlformats.org/presentationml/2006/main">
+  <p:cSld>
+    <p:spTree>
+      <p:nvGrpSpPr>
+        <p:cNvPr id="1" name=""/>
+        <p:cNvGrpSpPr/>
+        <p:nvPr/>
+      </p:nvGrpSpPr>
+      <p:grpSpPr>
+        <a:xfrm>
+          <a:off x="0" y="0"/>
+          <a:ext cx="0" cy="0"/>
+          <a:chOff x="0" y="0"/>
+          <a:chExt cx="0" cy="0"/>
+        </a:xfrm>
+      </p:grpSpPr>
+      <p:sp>
+        <p:nvSpPr>
+          <p:cNvPr id="2" name="Заголовок 1">
+            <a:extLst>
+              <a:ext uri="{FF2B5EF4-FFF2-40B4-BE49-F238E27FC236}">
+                <a16:creationId xmlns:a16="http://schemas.microsoft.com/office/drawing/2014/main" id="{6EEEA5D1-0226-4503-B2DA-E9659AE40609}"/>
+              </a:ext>
+            </a:extLst>
+          </p:cNvPr>
+          <p:cNvSpPr>
+            <a:spLocks noGrp="1"/>
+          </p:cNvSpPr>
+          <p:nvPr>
+            <p:ph type="title"/>
+          </p:nvPr>
+        </p:nvSpPr>
+        <p:spPr/>
+        <p:txBody>
+          <a:bodyPr/>
+          <a:lstStyle/>
+          <a:p>
+            <a:r>
+              <a:rPr lang="en-US" dirty="0">
+                <a:latin typeface="Arial Black" panose="020B0A04020102020204" pitchFamily="34" charset="0"/>
+              </a:rPr>
+              <a:t>Minimum</a:t>
+            </a:r>
+            <a:r>
+              <a:rPr lang="ru-RU" dirty="0">
+                <a:latin typeface="Arial Black" panose="020B0A04020102020204" pitchFamily="34" charset="0"/>
+              </a:rPr>
+              <a:t> и </a:t>
+            </a:r>
+            <a:r>
+              <a:rPr lang="en-US" dirty="0">
+                <a:latin typeface="Arial Black" panose="020B0A04020102020204" pitchFamily="34" charset="0"/>
+              </a:rPr>
+              <a:t>maximum</a:t>
+            </a:r>
+            <a:endParaRPr lang="ru-RU" dirty="0">
+              <a:latin typeface="Arial Black" panose="020B0A04020102020204" pitchFamily="34" charset="0"/>
+            </a:endParaRPr>
+          </a:p>
+        </p:txBody>
+      </p:sp>
+      <p:sp>
+        <p:nvSpPr>
+          <p:cNvPr id="3" name="Объект 2">
+            <a:extLst>
+              <a:ext uri="{FF2B5EF4-FFF2-40B4-BE49-F238E27FC236}">
+                <a16:creationId xmlns:a16="http://schemas.microsoft.com/office/drawing/2014/main" id="{A0ED103B-6041-4834-BA74-200D3824EF04}"/>
+              </a:ext>
+            </a:extLst>
+          </p:cNvPr>
+          <p:cNvSpPr>
+            <a:spLocks noGrp="1"/>
+          </p:cNvSpPr>
+          <p:nvPr>
+            <p:ph idx="1"/>
+          </p:nvPr>
+        </p:nvSpPr>
+        <p:spPr/>
+        <p:txBody>
+          <a:bodyPr/>
+          <a:lstStyle/>
+          <a:p>
+            <a:r>
+              <a:rPr lang="ru-RU" dirty="0">
+                <a:latin typeface="Arial" panose="020B0604020202020204" pitchFamily="34" charset="0"/>
+                <a:cs typeface="Arial" panose="020B0604020202020204" pitchFamily="34" charset="0"/>
+              </a:rPr>
+              <a:t>Хранятся в корне дерева</a:t>
+            </a:r>
+          </a:p>
+          <a:p>
+            <a:r>
+              <a:rPr lang="ru-RU" dirty="0">
+                <a:latin typeface="Arial" panose="020B0604020202020204" pitchFamily="34" charset="0"/>
+                <a:cs typeface="Arial" panose="020B0604020202020204" pitchFamily="34" charset="0"/>
+              </a:rPr>
+              <a:t>Запрос выполняется за</a:t>
+            </a:r>
+            <a:r>
+              <a:rPr lang="en-US" dirty="0">
+                <a:latin typeface="Arial" panose="020B0604020202020204" pitchFamily="34" charset="0"/>
+                <a:cs typeface="Arial" panose="020B0604020202020204" pitchFamily="34" charset="0"/>
+              </a:rPr>
+              <a:t> O(1)</a:t>
+            </a:r>
+            <a:r>
+              <a:rPr lang="ru-RU" dirty="0">
+                <a:latin typeface="Arial" panose="020B0604020202020204" pitchFamily="34" charset="0"/>
+                <a:cs typeface="Arial" panose="020B0604020202020204" pitchFamily="34" charset="0"/>
+              </a:rPr>
+              <a:t> </a:t>
+            </a:r>
+          </a:p>
+        </p:txBody>
+      </p:sp>
+    </p:spTree>
+    <p:extLst>
+      <p:ext uri="{BB962C8B-B14F-4D97-AF65-F5344CB8AC3E}">
+        <p14:creationId xmlns:p14="http://schemas.microsoft.com/office/powerpoint/2010/main" val="2060312068"/>
+      </p:ext>
+    </p:extLst>
+  </p:cSld>
+  <p:clrMapOvr>
+    <a:masterClrMapping/>
+  </p:clrMapOvr>
+</p:sld>
+</file>
+
+<file path=ppt/slides/slide8.xml><?xml version="1.0" encoding="utf-8"?>
+<p:sld xmlns:a="http://schemas.openxmlformats.org/drawingml/2006/main" xmlns:r="http://schemas.openxmlformats.org/officeDocument/2006/relationships" xmlns:p="http://schemas.openxmlformats.org/presentationml/2006/main">
+  <p:cSld>
+    <p:spTree>
+      <p:nvGrpSpPr>
+        <p:cNvPr id="1" name=""/>
+        <p:cNvGrpSpPr/>
+        <p:nvPr/>
+      </p:nvGrpSpPr>
+      <p:grpSpPr>
+        <a:xfrm>
+          <a:off x="0" y="0"/>
+          <a:ext cx="0" cy="0"/>
+          <a:chOff x="0" y="0"/>
+          <a:chExt cx="0" cy="0"/>
+        </a:xfrm>
+      </p:grpSpPr>
+      <p:sp>
+        <p:nvSpPr>
+          <p:cNvPr id="2" name="Заголовок 1">
+            <a:extLst>
+              <a:ext uri="{FF2B5EF4-FFF2-40B4-BE49-F238E27FC236}">
+                <a16:creationId xmlns:a16="http://schemas.microsoft.com/office/drawing/2014/main" id="{40F3F23E-6165-450A-B04F-A02EA7FE722D}"/>
+              </a:ext>
+            </a:extLst>
+          </p:cNvPr>
+          <p:cNvSpPr>
+            <a:spLocks noGrp="1"/>
+          </p:cNvSpPr>
+          <p:nvPr>
+            <p:ph type="title"/>
+          </p:nvPr>
+        </p:nvSpPr>
+        <p:spPr/>
+        <p:txBody>
+          <a:bodyPr/>
+          <a:lstStyle/>
+          <a:p>
+            <a:r>
+              <a:rPr lang="en-US" dirty="0"/>
+              <a:t>Find</a:t>
+            </a:r>
+            <a:endParaRPr lang="ru-RU" dirty="0"/>
+          </a:p>
+        </p:txBody>
+      </p:sp>
+      <p:sp>
+        <p:nvSpPr>
+          <p:cNvPr id="3" name="Объект 2">
+            <a:extLst>
+              <a:ext uri="{FF2B5EF4-FFF2-40B4-BE49-F238E27FC236}">
+                <a16:creationId xmlns:a16="http://schemas.microsoft.com/office/drawing/2014/main" id="{9FED0B63-1213-4FE2-A473-702593183CB8}"/>
+              </a:ext>
+            </a:extLst>
+          </p:cNvPr>
+          <p:cNvSpPr>
+            <a:spLocks noGrp="1"/>
+          </p:cNvSpPr>
+          <p:nvPr>
+            <p:ph idx="1"/>
+          </p:nvPr>
+        </p:nvSpPr>
+        <p:spPr/>
+        <p:txBody>
+          <a:bodyPr/>
+          <a:lstStyle/>
+          <a:p>
+            <a:endParaRPr lang="ru-RU"/>
+          </a:p>
+        </p:txBody>
+      </p:sp>
+    </p:spTree>
+    <p:extLst>
+      <p:ext uri="{BB962C8B-B14F-4D97-AF65-F5344CB8AC3E}">
+        <p14:creationId xmlns:p14="http://schemas.microsoft.com/office/powerpoint/2010/main" val="1082805085"/>
+      </p:ext>
+    </p:extLst>
+  </p:cSld>
+  <p:clrMapOvr>
+    <a:masterClrMapping/>
+  </p:clrMapOvr>
+</p:sld>
+</file>
+
+<file path=ppt/slides/slide9.xml><?xml version="1.0" encoding="utf-8"?>
+<p:sld xmlns:a="http://schemas.openxmlformats.org/drawingml/2006/main" xmlns:r="http://schemas.openxmlformats.org/officeDocument/2006/relationships" xmlns:p="http://schemas.openxmlformats.org/presentationml/2006/main">
+  <p:cSld>
+    <p:spTree>
+      <p:nvGrpSpPr>
+        <p:cNvPr id="1" name=""/>
+        <p:cNvGrpSpPr/>
+        <p:nvPr/>
+      </p:nvGrpSpPr>
+      <p:grpSpPr>
+        <a:xfrm>
+          <a:off x="0" y="0"/>
+          <a:ext cx="0" cy="0"/>
+          <a:chOff x="0" y="0"/>
+          <a:chExt cx="0" cy="0"/>
+        </a:xfrm>
+      </p:grpSpPr>
+      <p:sp>
+        <p:nvSpPr>
+          <p:cNvPr id="2" name="Заголовок 1">
+            <a:extLst>
+              <a:ext uri="{FF2B5EF4-FFF2-40B4-BE49-F238E27FC236}">
+                <a16:creationId xmlns:a16="http://schemas.microsoft.com/office/drawing/2014/main" id="{9504BDF3-E3AE-4539-BF8F-ABF74CF8CB71}"/>
+              </a:ext>
+            </a:extLst>
+          </p:cNvPr>
+          <p:cNvSpPr>
+            <a:spLocks noGrp="1"/>
+          </p:cNvSpPr>
+          <p:nvPr>
+            <p:ph type="title"/>
+          </p:nvPr>
+        </p:nvSpPr>
+        <p:spPr/>
+        <p:txBody>
+          <a:bodyPr/>
+          <a:lstStyle/>
+          <a:p>
+            <a:r>
+              <a:rPr lang="en-US" dirty="0"/>
+              <a:t>Insert</a:t>
+            </a:r>
+            <a:endParaRPr lang="ru-RU" dirty="0"/>
+          </a:p>
+        </p:txBody>
+      </p:sp>
+      <p:sp>
+        <p:nvSpPr>
+          <p:cNvPr id="3" name="Объект 2">
+            <a:extLst>
+              <a:ext uri="{FF2B5EF4-FFF2-40B4-BE49-F238E27FC236}">
+                <a16:creationId xmlns:a16="http://schemas.microsoft.com/office/drawing/2014/main" id="{7264D779-69CF-434B-B1D9-E87BCFF7D02E}"/>
+              </a:ext>
+            </a:extLst>
+          </p:cNvPr>
+          <p:cNvSpPr>
+            <a:spLocks noGrp="1"/>
+          </p:cNvSpPr>
+          <p:nvPr>
+            <p:ph idx="1"/>
+          </p:nvPr>
+        </p:nvSpPr>
+        <p:spPr/>
+        <p:txBody>
+          <a:bodyPr/>
+          <a:lstStyle/>
+          <a:p>
+            <a:endParaRPr lang="ru-RU"/>
+          </a:p>
+        </p:txBody>
+      </p:sp>
+    </p:spTree>
+    <p:extLst>
+      <p:ext uri="{BB962C8B-B14F-4D97-AF65-F5344CB8AC3E}">
+        <p14:creationId xmlns:p14="http://schemas.microsoft.com/office/powerpoint/2010/main" val="1750247297"/>
       </p:ext>
     </p:extLst>
   </p:cSld>

</xml_diff>

<commit_message>
Update Presentation van Emde Boas tree
</commit_message>
<xml_diff>
--- a/Presentation van Emde Boas tree.pptx
+++ b/Presentation van Emde Boas tree.pptx
@@ -7421,7 +7421,7 @@
                 <a:latin typeface="Arial" panose="020B0604020202020204" pitchFamily="34" charset="0"/>
                 <a:cs typeface="Arial" panose="020B0604020202020204" pitchFamily="34" charset="0"/>
               </a:rPr>
-              <a:t>min = none</a:t>
+              <a:t>min = null</a:t>
             </a:r>
             <a:br>
               <a:rPr lang="en-US" altLang="ru-RU" dirty="0">
@@ -7434,7 +7434,7 @@
                 <a:latin typeface="Arial" panose="020B0604020202020204" pitchFamily="34" charset="0"/>
                 <a:cs typeface="Arial" panose="020B0604020202020204" pitchFamily="34" charset="0"/>
               </a:rPr>
-              <a:t>    max = none</a:t>
+              <a:t>    max = null</a:t>
             </a:r>
             <a:br>
               <a:rPr lang="en-US" altLang="ru-RU" dirty="0">
@@ -8138,7 +8138,7 @@
                 <a:latin typeface="Arial" panose="020B0604020202020204" pitchFamily="34" charset="0"/>
                 <a:cs typeface="Arial" panose="020B0604020202020204" pitchFamily="34" charset="0"/>
               </a:rPr>
-              <a:t>USize</a:t>
+              <a:t>universeSize</a:t>
             </a:r>
             <a:r>
               <a:rPr lang="en-US" dirty="0">
@@ -8232,7 +8232,7 @@
                 <a:latin typeface="Arial" panose="020B0604020202020204" pitchFamily="34" charset="0"/>
                 <a:cs typeface="Arial" panose="020B0604020202020204" pitchFamily="34" charset="0"/>
               </a:rPr>
-              <a:t>none</a:t>
+              <a:t>null</a:t>
             </a:r>
             <a:br>
               <a:rPr lang="en-US" b="1" dirty="0">
@@ -8252,7 +8252,7 @@
                 <a:latin typeface="Arial" panose="020B0604020202020204" pitchFamily="34" charset="0"/>
                 <a:cs typeface="Arial" panose="020B0604020202020204" pitchFamily="34" charset="0"/>
               </a:rPr>
-              <a:t>min != none </a:t>
+              <a:t>min != null </a:t>
             </a:r>
             <a:r>
               <a:rPr lang="en-US" b="1" dirty="0">
@@ -8353,7 +8353,7 @@
                 <a:latin typeface="Arial" panose="020B0604020202020204" pitchFamily="34" charset="0"/>
                 <a:cs typeface="Arial" panose="020B0604020202020204" pitchFamily="34" charset="0"/>
               </a:rPr>
-              <a:t>max != none </a:t>
+              <a:t>max != null </a:t>
             </a:r>
             <a:r>
               <a:rPr lang="en-US" b="1" dirty="0">
@@ -8509,7 +8509,7 @@
                 <a:latin typeface="Arial" panose="020B0604020202020204" pitchFamily="34" charset="0"/>
                 <a:cs typeface="Arial" panose="020B0604020202020204" pitchFamily="34" charset="0"/>
               </a:rPr>
-              <a:t>temp == none</a:t>
+              <a:t>temp == null</a:t>
             </a:r>
             <a:br>
               <a:rPr lang="en-US" b="1" dirty="0">
@@ -8529,7 +8529,7 @@
                 <a:latin typeface="Arial" panose="020B0604020202020204" pitchFamily="34" charset="0"/>
                 <a:cs typeface="Arial" panose="020B0604020202020204" pitchFamily="34" charset="0"/>
               </a:rPr>
-              <a:t>none</a:t>
+              <a:t>null</a:t>
             </a:r>
             <a:br>
               <a:rPr lang="en-US" b="1" dirty="0">
@@ -8830,7 +8830,7 @@
                 <a:latin typeface="Arial" panose="020B0604020202020204" pitchFamily="34" charset="0"/>
                 <a:cs typeface="Arial" panose="020B0604020202020204" pitchFamily="34" charset="0"/>
               </a:rPr>
-              <a:t>USize</a:t>
+              <a:t>universeSize</a:t>
             </a:r>
             <a:r>
               <a:rPr lang="en-US" dirty="0">
@@ -8924,7 +8924,7 @@
                 <a:latin typeface="Arial" panose="020B0604020202020204" pitchFamily="34" charset="0"/>
                 <a:cs typeface="Arial" panose="020B0604020202020204" pitchFamily="34" charset="0"/>
               </a:rPr>
-              <a:t>none</a:t>
+              <a:t>null</a:t>
             </a:r>
             <a:br>
               <a:rPr lang="en-US" b="1" dirty="0">
@@ -8944,7 +8944,7 @@
                 <a:latin typeface="Arial" panose="020B0604020202020204" pitchFamily="34" charset="0"/>
                 <a:cs typeface="Arial" panose="020B0604020202020204" pitchFamily="34" charset="0"/>
               </a:rPr>
-              <a:t>max != none </a:t>
+              <a:t>max != null </a:t>
             </a:r>
             <a:r>
               <a:rPr lang="en-US" b="1" dirty="0">
@@ -9038,7 +9038,7 @@
                 <a:latin typeface="Arial" panose="020B0604020202020204" pitchFamily="34" charset="0"/>
                 <a:cs typeface="Arial" panose="020B0604020202020204" pitchFamily="34" charset="0"/>
               </a:rPr>
-              <a:t>max != none </a:t>
+              <a:t>max != null </a:t>
             </a:r>
             <a:r>
               <a:rPr lang="en-US" b="1" dirty="0">
@@ -9173,7 +9173,7 @@
                 <a:latin typeface="Arial" panose="020B0604020202020204" pitchFamily="34" charset="0"/>
                 <a:cs typeface="Arial" panose="020B0604020202020204" pitchFamily="34" charset="0"/>
               </a:rPr>
-              <a:t>temp == none</a:t>
+              <a:t>temp == null</a:t>
             </a:r>
             <a:br>
               <a:rPr lang="en-US" b="1" dirty="0">
@@ -9193,7 +9193,7 @@
                 <a:latin typeface="Arial" panose="020B0604020202020204" pitchFamily="34" charset="0"/>
                 <a:cs typeface="Arial" panose="020B0604020202020204" pitchFamily="34" charset="0"/>
               </a:rPr>
-              <a:t>min != none </a:t>
+              <a:t>min != null </a:t>
             </a:r>
             <a:r>
               <a:rPr lang="en-US" b="1" dirty="0">
@@ -9261,7 +9261,7 @@
                 <a:latin typeface="Arial" panose="020B0604020202020204" pitchFamily="34" charset="0"/>
                 <a:cs typeface="Arial" panose="020B0604020202020204" pitchFamily="34" charset="0"/>
               </a:rPr>
-              <a:t>none</a:t>
+              <a:t>null</a:t>
             </a:r>
             <a:br>
               <a:rPr lang="en-US" b="1" dirty="0">
@@ -13627,8 +13627,8 @@
         </p:nvSpPr>
         <p:spPr>
           <a:xfrm>
-            <a:off x="503853" y="1825625"/>
-            <a:ext cx="6092889" cy="4351338"/>
+            <a:off x="838200" y="1825625"/>
+            <a:ext cx="5758542" cy="4351338"/>
           </a:xfrm>
         </p:spPr>
         <p:txBody>
@@ -13685,7 +13685,7 @@
                 <a:latin typeface="Arial" panose="020B0604020202020204" pitchFamily="34" charset="0"/>
                 <a:cs typeface="Arial" panose="020B0604020202020204" pitchFamily="34" charset="0"/>
               </a:rPr>
-              <a:t>If </a:t>
+              <a:t>if </a:t>
             </a:r>
             <a:r>
               <a:rPr lang="en-US" dirty="0">
@@ -13746,7 +13746,7 @@
                 <a:latin typeface="Arial" panose="020B0604020202020204" pitchFamily="34" charset="0"/>
                 <a:cs typeface="Arial" panose="020B0604020202020204" pitchFamily="34" charset="0"/>
               </a:rPr>
-              <a:t>none</a:t>
+              <a:t>null</a:t>
             </a:r>
             <a:br>
               <a:rPr lang="en-US" dirty="0">
@@ -13759,7 +13759,7 @@
                 <a:latin typeface="Arial" panose="020B0604020202020204" pitchFamily="34" charset="0"/>
                 <a:cs typeface="Arial" panose="020B0604020202020204" pitchFamily="34" charset="0"/>
               </a:rPr>
-              <a:t>If </a:t>
+              <a:t>if </a:t>
             </a:r>
             <a:r>
               <a:rPr lang="en-US" dirty="0">
@@ -13799,14 +13799,14 @@
                 <a:latin typeface="Arial" panose="020B0604020202020204" pitchFamily="34" charset="0"/>
                 <a:cs typeface="Arial" panose="020B0604020202020204" pitchFamily="34" charset="0"/>
               </a:rPr>
-              <a:t>If </a:t>
+              <a:t>if </a:t>
             </a:r>
             <a:r>
               <a:rPr lang="en-US" dirty="0" err="1">
                 <a:latin typeface="Arial" panose="020B0604020202020204" pitchFamily="34" charset="0"/>
                 <a:cs typeface="Arial" panose="020B0604020202020204" pitchFamily="34" charset="0"/>
               </a:rPr>
-              <a:t>USize</a:t>
+              <a:t>universeSize</a:t>
             </a:r>
             <a:r>
               <a:rPr lang="en-US" dirty="0">
@@ -13826,7 +13826,7 @@
                 <a:latin typeface="Arial" panose="020B0604020202020204" pitchFamily="34" charset="0"/>
                 <a:cs typeface="Arial" panose="020B0604020202020204" pitchFamily="34" charset="0"/>
               </a:rPr>
-              <a:t>    If </a:t>
+              <a:t>    if </a:t>
             </a:r>
             <a:r>
               <a:rPr lang="en-US" dirty="0">
@@ -13886,7 +13886,7 @@
                 <a:latin typeface="Arial" panose="020B0604020202020204" pitchFamily="34" charset="0"/>
                 <a:cs typeface="Arial" panose="020B0604020202020204" pitchFamily="34" charset="0"/>
               </a:rPr>
-              <a:t>If </a:t>
+              <a:t>if </a:t>
             </a:r>
             <a:r>
               <a:rPr lang="en-US" dirty="0">

</xml_diff>